<commit_message>
Fix AirCraftCarrier exercise + upload Lightning talk
</commit_message>
<xml_diff>
--- a/week-03/Demo-week03.pptx
+++ b/week-03/Demo-week03.pptx
@@ -222,7 +222,7 @@
           <a:p>
             <a:fld id="{0E93D86F-796A-114B-B042-AB87447EFA6A}" type="datetimeFigureOut">
               <a:rPr lang="en-US" smtClean="0"/>
-              <a:t>12/6/17</a:t>
+              <a:t>12/8/17</a:t>
             </a:fld>
             <a:endParaRPr lang="en-US"/>
           </a:p>
@@ -621,7 +621,7 @@
           <a:p>
             <a:fld id="{0934A1EB-43A9-CB4A-A9A3-A57371AFEF17}" type="datetimeFigureOut">
               <a:rPr lang="en-US" smtClean="0"/>
-              <a:t>12/6/17</a:t>
+              <a:t>12/8/17</a:t>
             </a:fld>
             <a:endParaRPr lang="en-US"/>
           </a:p>
@@ -791,7 +791,7 @@
           <a:p>
             <a:fld id="{0934A1EB-43A9-CB4A-A9A3-A57371AFEF17}" type="datetimeFigureOut">
               <a:rPr lang="en-US" smtClean="0"/>
-              <a:t>12/6/17</a:t>
+              <a:t>12/8/17</a:t>
             </a:fld>
             <a:endParaRPr lang="en-US"/>
           </a:p>
@@ -971,7 +971,7 @@
           <a:p>
             <a:fld id="{0934A1EB-43A9-CB4A-A9A3-A57371AFEF17}" type="datetimeFigureOut">
               <a:rPr lang="en-US" smtClean="0"/>
-              <a:t>12/6/17</a:t>
+              <a:t>12/8/17</a:t>
             </a:fld>
             <a:endParaRPr lang="en-US"/>
           </a:p>
@@ -1141,7 +1141,7 @@
           <a:p>
             <a:fld id="{0934A1EB-43A9-CB4A-A9A3-A57371AFEF17}" type="datetimeFigureOut">
               <a:rPr lang="en-US" smtClean="0"/>
-              <a:t>12/6/17</a:t>
+              <a:t>12/8/17</a:t>
             </a:fld>
             <a:endParaRPr lang="en-US"/>
           </a:p>
@@ -1387,7 +1387,7 @@
           <a:p>
             <a:fld id="{0934A1EB-43A9-CB4A-A9A3-A57371AFEF17}" type="datetimeFigureOut">
               <a:rPr lang="en-US" smtClean="0"/>
-              <a:t>12/6/17</a:t>
+              <a:t>12/8/17</a:t>
             </a:fld>
             <a:endParaRPr lang="en-US"/>
           </a:p>
@@ -1619,7 +1619,7 @@
           <a:p>
             <a:fld id="{0934A1EB-43A9-CB4A-A9A3-A57371AFEF17}" type="datetimeFigureOut">
               <a:rPr lang="en-US" smtClean="0"/>
-              <a:t>12/6/17</a:t>
+              <a:t>12/8/17</a:t>
             </a:fld>
             <a:endParaRPr lang="en-US"/>
           </a:p>
@@ -1986,7 +1986,7 @@
           <a:p>
             <a:fld id="{0934A1EB-43A9-CB4A-A9A3-A57371AFEF17}" type="datetimeFigureOut">
               <a:rPr lang="en-US" smtClean="0"/>
-              <a:t>12/6/17</a:t>
+              <a:t>12/8/17</a:t>
             </a:fld>
             <a:endParaRPr lang="en-US"/>
           </a:p>
@@ -2104,7 +2104,7 @@
           <a:p>
             <a:fld id="{0934A1EB-43A9-CB4A-A9A3-A57371AFEF17}" type="datetimeFigureOut">
               <a:rPr lang="en-US" smtClean="0"/>
-              <a:t>12/6/17</a:t>
+              <a:t>12/8/17</a:t>
             </a:fld>
             <a:endParaRPr lang="en-US"/>
           </a:p>
@@ -2199,7 +2199,7 @@
           <a:p>
             <a:fld id="{0934A1EB-43A9-CB4A-A9A3-A57371AFEF17}" type="datetimeFigureOut">
               <a:rPr lang="en-US" smtClean="0"/>
-              <a:t>12/6/17</a:t>
+              <a:t>12/8/17</a:t>
             </a:fld>
             <a:endParaRPr lang="en-US"/>
           </a:p>
@@ -2476,7 +2476,7 @@
           <a:p>
             <a:fld id="{0934A1EB-43A9-CB4A-A9A3-A57371AFEF17}" type="datetimeFigureOut">
               <a:rPr lang="en-US" smtClean="0"/>
-              <a:t>12/6/17</a:t>
+              <a:t>12/8/17</a:t>
             </a:fld>
             <a:endParaRPr lang="en-US"/>
           </a:p>
@@ -2729,7 +2729,7 @@
           <a:p>
             <a:fld id="{0934A1EB-43A9-CB4A-A9A3-A57371AFEF17}" type="datetimeFigureOut">
               <a:rPr lang="en-US" smtClean="0"/>
-              <a:t>12/6/17</a:t>
+              <a:t>12/8/17</a:t>
             </a:fld>
             <a:endParaRPr lang="en-US"/>
           </a:p>
@@ -2942,7 +2942,7 @@
           <a:p>
             <a:fld id="{0934A1EB-43A9-CB4A-A9A3-A57371AFEF17}" type="datetimeFigureOut">
               <a:rPr lang="en-US" smtClean="0"/>
-              <a:t>12/6/17</a:t>
+              <a:t>12/8/17</a:t>
             </a:fld>
             <a:endParaRPr lang="en-US"/>
           </a:p>
@@ -4282,7 +4282,7 @@
         <p:spPr>
           <a:xfrm>
             <a:off x="1116106" y="1210235"/>
-            <a:ext cx="7328647" cy="833718"/>
+            <a:ext cx="7328647" cy="271337"/>
           </a:xfrm>
           <a:prstGeom prst="rect">
             <a:avLst/>
@@ -4330,8 +4330,8 @@
         </p:nvSpPr>
         <p:spPr>
           <a:xfrm>
-            <a:off x="1116103" y="2043953"/>
-            <a:ext cx="7328647" cy="3119717"/>
+            <a:off x="1116103" y="1883595"/>
+            <a:ext cx="7328647" cy="3280075"/>
           </a:xfrm>
           <a:prstGeom prst="rect">
             <a:avLst/>
@@ -4482,6 +4482,174 @@
       </p:pic>
       <p:sp>
         <p:nvSpPr>
+          <p:cNvPr id="9" name="TextBox 8"/>
+          <p:cNvSpPr txBox="1"/>
+          <p:nvPr/>
+        </p:nvSpPr>
+        <p:spPr>
+          <a:xfrm>
+            <a:off x="8623092" y="3104035"/>
+            <a:ext cx="2068387" cy="461665"/>
+          </a:xfrm>
+          <a:prstGeom prst="rect">
+            <a:avLst/>
+          </a:prstGeom>
+          <a:noFill/>
+        </p:spPr>
+        <p:txBody>
+          <a:bodyPr wrap="none" rtlCol="0">
+            <a:spAutoFit/>
+          </a:bodyPr>
+          <a:lstStyle/>
+          <a:p>
+            <a:r>
+              <a:rPr lang="en-US" sz="2400" dirty="0" smtClean="0"/>
+              <a:t>CALCULATIONS</a:t>
+            </a:r>
+            <a:endParaRPr lang="en-US" sz="2400" dirty="0"/>
+          </a:p>
+        </p:txBody>
+      </p:sp>
+      <p:sp>
+        <p:nvSpPr>
+          <p:cNvPr id="10" name="TextBox 9"/>
+          <p:cNvSpPr txBox="1"/>
+          <p:nvPr/>
+        </p:nvSpPr>
+        <p:spPr>
+          <a:xfrm>
+            <a:off x="8623092" y="1081643"/>
+            <a:ext cx="3470694" cy="461665"/>
+          </a:xfrm>
+          <a:prstGeom prst="rect">
+            <a:avLst/>
+          </a:prstGeom>
+          <a:noFill/>
+        </p:spPr>
+        <p:txBody>
+          <a:bodyPr wrap="square" rtlCol="0">
+            <a:spAutoFit/>
+          </a:bodyPr>
+          <a:lstStyle/>
+          <a:p>
+            <a:r>
+              <a:rPr lang="en-US" sz="2400" dirty="0" smtClean="0"/>
+              <a:t>TERMINATING CONDITION</a:t>
+            </a:r>
+            <a:endParaRPr lang="en-US" sz="2400" dirty="0"/>
+          </a:p>
+        </p:txBody>
+      </p:sp>
+      <p:sp>
+        <p:nvSpPr>
+          <p:cNvPr id="11" name="TextBox 10"/>
+          <p:cNvSpPr txBox="1"/>
+          <p:nvPr/>
+        </p:nvSpPr>
+        <p:spPr>
+          <a:xfrm>
+            <a:off x="8637052" y="5648529"/>
+            <a:ext cx="1642437" cy="461665"/>
+          </a:xfrm>
+          <a:prstGeom prst="rect">
+            <a:avLst/>
+          </a:prstGeom>
+          <a:noFill/>
+        </p:spPr>
+        <p:txBody>
+          <a:bodyPr wrap="none" rtlCol="0">
+            <a:spAutoFit/>
+          </a:bodyPr>
+          <a:lstStyle/>
+          <a:p>
+            <a:r>
+              <a:rPr lang="en-US" sz="2400" smtClean="0"/>
+              <a:t>RECURSION</a:t>
+            </a:r>
+            <a:endParaRPr lang="en-US" sz="2400" dirty="0"/>
+          </a:p>
+        </p:txBody>
+      </p:sp>
+      <p:sp>
+        <p:nvSpPr>
+          <p:cNvPr id="12" name="Rectangle 11"/>
+          <p:cNvSpPr/>
+          <p:nvPr/>
+        </p:nvSpPr>
+        <p:spPr>
+          <a:xfrm>
+            <a:off x="1116102" y="1481572"/>
+            <a:ext cx="7328647" cy="402023"/>
+          </a:xfrm>
+          <a:prstGeom prst="rect">
+            <a:avLst/>
+          </a:prstGeom>
+          <a:solidFill>
+            <a:schemeClr val="accent2">
+              <a:lumMod val="20000"/>
+              <a:lumOff val="80000"/>
+            </a:schemeClr>
+          </a:solidFill>
+          <a:ln>
+            <a:noFill/>
+          </a:ln>
+        </p:spPr>
+        <p:style>
+          <a:lnRef idx="2">
+            <a:schemeClr val="accent1">
+              <a:shade val="50000"/>
+            </a:schemeClr>
+          </a:lnRef>
+          <a:fillRef idx="1">
+            <a:schemeClr val="accent1"/>
+          </a:fillRef>
+          <a:effectRef idx="0">
+            <a:schemeClr val="accent1"/>
+          </a:effectRef>
+          <a:fontRef idx="minor">
+            <a:schemeClr val="lt1"/>
+          </a:fontRef>
+        </p:style>
+        <p:txBody>
+          <a:bodyPr rtlCol="0" anchor="ctr"/>
+          <a:lstStyle/>
+          <a:p>
+            <a:pPr algn="ctr"/>
+            <a:endParaRPr lang="en-US"/>
+          </a:p>
+        </p:txBody>
+      </p:sp>
+      <p:sp>
+        <p:nvSpPr>
+          <p:cNvPr id="13" name="TextBox 12"/>
+          <p:cNvSpPr txBox="1"/>
+          <p:nvPr/>
+        </p:nvSpPr>
+        <p:spPr>
+          <a:xfrm>
+            <a:off x="8637052" y="1451750"/>
+            <a:ext cx="3470694" cy="461665"/>
+          </a:xfrm>
+          <a:prstGeom prst="rect">
+            <a:avLst/>
+          </a:prstGeom>
+          <a:noFill/>
+        </p:spPr>
+        <p:txBody>
+          <a:bodyPr wrap="square" rtlCol="0">
+            <a:spAutoFit/>
+          </a:bodyPr>
+          <a:lstStyle/>
+          <a:p>
+            <a:r>
+              <a:rPr lang="en-US" sz="2400" dirty="0" smtClean="0"/>
+              <a:t>DRAWING</a:t>
+            </a:r>
+          </a:p>
+        </p:txBody>
+      </p:sp>
+      <p:sp>
+        <p:nvSpPr>
           <p:cNvPr id="2" name="TextBox 1"/>
           <p:cNvSpPr txBox="1"/>
           <p:nvPr/>
@@ -5373,96 +5541,6 @@
               <a:ea typeface="Courier New" charset="0"/>
               <a:cs typeface="Courier New" charset="0"/>
             </a:endParaRPr>
-          </a:p>
-        </p:txBody>
-      </p:sp>
-      <p:sp>
-        <p:nvSpPr>
-          <p:cNvPr id="9" name="TextBox 8"/>
-          <p:cNvSpPr txBox="1"/>
-          <p:nvPr/>
-        </p:nvSpPr>
-        <p:spPr>
-          <a:xfrm>
-            <a:off x="8721306" y="3459381"/>
-            <a:ext cx="2068387" cy="461665"/>
-          </a:xfrm>
-          <a:prstGeom prst="rect">
-            <a:avLst/>
-          </a:prstGeom>
-          <a:noFill/>
-        </p:spPr>
-        <p:txBody>
-          <a:bodyPr wrap="none" rtlCol="0">
-            <a:spAutoFit/>
-          </a:bodyPr>
-          <a:lstStyle/>
-          <a:p>
-            <a:r>
-              <a:rPr lang="en-US" sz="2400" dirty="0" smtClean="0"/>
-              <a:t>CALCULATIONS</a:t>
-            </a:r>
-            <a:endParaRPr lang="en-US" sz="2400" dirty="0"/>
-          </a:p>
-        </p:txBody>
-      </p:sp>
-      <p:sp>
-        <p:nvSpPr>
-          <p:cNvPr id="10" name="TextBox 9"/>
-          <p:cNvSpPr txBox="1"/>
-          <p:nvPr/>
-        </p:nvSpPr>
-        <p:spPr>
-          <a:xfrm>
-            <a:off x="8623092" y="1396261"/>
-            <a:ext cx="3470694" cy="461665"/>
-          </a:xfrm>
-          <a:prstGeom prst="rect">
-            <a:avLst/>
-          </a:prstGeom>
-          <a:noFill/>
-        </p:spPr>
-        <p:txBody>
-          <a:bodyPr wrap="square" rtlCol="0">
-            <a:spAutoFit/>
-          </a:bodyPr>
-          <a:lstStyle/>
-          <a:p>
-            <a:r>
-              <a:rPr lang="en-US" sz="2400" dirty="0" smtClean="0"/>
-              <a:t>TERMINATING CONDITION</a:t>
-            </a:r>
-            <a:endParaRPr lang="en-US" sz="2400" dirty="0"/>
-          </a:p>
-        </p:txBody>
-      </p:sp>
-      <p:sp>
-        <p:nvSpPr>
-          <p:cNvPr id="11" name="TextBox 10"/>
-          <p:cNvSpPr txBox="1"/>
-          <p:nvPr/>
-        </p:nvSpPr>
-        <p:spPr>
-          <a:xfrm>
-            <a:off x="8721306" y="5388359"/>
-            <a:ext cx="1642437" cy="461665"/>
-          </a:xfrm>
-          <a:prstGeom prst="rect">
-            <a:avLst/>
-          </a:prstGeom>
-          <a:noFill/>
-        </p:spPr>
-        <p:txBody>
-          <a:bodyPr wrap="none" rtlCol="0">
-            <a:spAutoFit/>
-          </a:bodyPr>
-          <a:lstStyle/>
-          <a:p>
-            <a:r>
-              <a:rPr lang="en-US" sz="2400" smtClean="0"/>
-              <a:t>RECURSION</a:t>
-            </a:r>
-            <a:endParaRPr lang="en-US" sz="2400" dirty="0"/>
           </a:p>
         </p:txBody>
       </p:sp>
@@ -8244,7 +8322,7 @@
         </p:blipFill>
         <p:spPr>
           <a:xfrm>
-            <a:off x="2856000" y="2349500"/>
+            <a:off x="2856000" y="2492380"/>
             <a:ext cx="6477000" cy="3219450"/>
           </a:xfrm>
           <a:prstGeom prst="rect">
@@ -8426,15 +8504,7 @@
             <a:pPr algn="ctr"/>
             <a:r>
               <a:rPr lang="en-US" sz="2400" dirty="0" smtClean="0"/>
-              <a:t>OMG! I WAS WRONG FROM THE </a:t>
-            </a:r>
-            <a:r>
-              <a:rPr lang="en-US" sz="2400" dirty="0" smtClean="0"/>
-              <a:t>FIRST </a:t>
-            </a:r>
-            <a:r>
-              <a:rPr lang="en-US" sz="2400" dirty="0" smtClean="0"/>
-              <a:t>STEP</a:t>
+              <a:t>OMG! I WAS WRONG FROM THE FIRST STEP</a:t>
             </a:r>
             <a:endParaRPr lang="en-US" sz="2400" dirty="0"/>
           </a:p>
@@ -11908,7 +11978,7 @@
       </p:grpSpPr>
       <p:pic>
         <p:nvPicPr>
-          <p:cNvPr id="5" name="Picture 4"/>
+          <p:cNvPr id="6" name="Picture 5"/>
           <p:cNvPicPr>
             <a:picLocks noChangeAspect="1"/>
           </p:cNvPicPr>
@@ -11928,8 +11998,8 @@
         </p:blipFill>
         <p:spPr>
           <a:xfrm>
-            <a:off x="116417" y="135467"/>
-            <a:ext cx="3060700" cy="635000"/>
+            <a:off x="10358439" y="4756321"/>
+            <a:ext cx="1833561" cy="2187407"/>
           </a:xfrm>
           <a:prstGeom prst="rect">
             <a:avLst/>
@@ -11938,7 +12008,7 @@
       </p:pic>
       <p:pic>
         <p:nvPicPr>
-          <p:cNvPr id="6" name="Picture 5"/>
+          <p:cNvPr id="2" name="Picture 1"/>
           <p:cNvPicPr>
             <a:picLocks noChangeAspect="1"/>
           </p:cNvPicPr>
@@ -11958,8 +12028,8 @@
         </p:blipFill>
         <p:spPr>
           <a:xfrm>
-            <a:off x="10358439" y="4756321"/>
-            <a:ext cx="1833561" cy="2187407"/>
+            <a:off x="662498" y="923576"/>
+            <a:ext cx="6477000" cy="3219450"/>
           </a:xfrm>
           <a:prstGeom prst="rect">
             <a:avLst/>
@@ -11968,7 +12038,7 @@
       </p:pic>
       <p:pic>
         <p:nvPicPr>
-          <p:cNvPr id="2" name="Picture 1"/>
+          <p:cNvPr id="3" name="Picture 2"/>
           <p:cNvPicPr>
             <a:picLocks noChangeAspect="1"/>
           </p:cNvPicPr>
@@ -11988,47 +12058,17 @@
         </p:blipFill>
         <p:spPr>
           <a:xfrm>
-            <a:off x="3177117" y="552091"/>
-            <a:ext cx="6477000" cy="3219450"/>
+            <a:off x="349227" y="3484659"/>
+            <a:ext cx="6704543" cy="2736850"/>
           </a:xfrm>
           <a:prstGeom prst="rect">
             <a:avLst/>
           </a:prstGeom>
         </p:spPr>
       </p:pic>
-      <p:sp>
-        <p:nvSpPr>
-          <p:cNvPr id="7" name="TextBox 6"/>
-          <p:cNvSpPr txBox="1"/>
-          <p:nvPr/>
-        </p:nvSpPr>
-        <p:spPr>
-          <a:xfrm>
-            <a:off x="705766" y="3249549"/>
-            <a:ext cx="2471351" cy="523220"/>
-          </a:xfrm>
-          <a:prstGeom prst="rect">
-            <a:avLst/>
-          </a:prstGeom>
-          <a:noFill/>
-        </p:spPr>
-        <p:txBody>
-          <a:bodyPr wrap="square" rtlCol="0">
-            <a:spAutoFit/>
-          </a:bodyPr>
-          <a:lstStyle/>
-          <a:p>
-            <a:r>
-              <a:rPr lang="en-US" sz="2800" dirty="0" smtClean="0"/>
-              <a:t>N = 3</a:t>
-            </a:r>
-            <a:endParaRPr lang="en-US" sz="2800" dirty="0"/>
-          </a:p>
-        </p:txBody>
-      </p:sp>
       <p:pic>
         <p:nvPicPr>
-          <p:cNvPr id="3" name="Picture 2"/>
+          <p:cNvPr id="5" name="Picture 4"/>
           <p:cNvPicPr>
             <a:picLocks noChangeAspect="1"/>
           </p:cNvPicPr>
@@ -12048,14 +12088,344 @@
         </p:blipFill>
         <p:spPr>
           <a:xfrm>
-            <a:off x="2949574" y="3113174"/>
-            <a:ext cx="6704543" cy="2736850"/>
+            <a:off x="116417" y="135467"/>
+            <a:ext cx="3060700" cy="635000"/>
           </a:xfrm>
           <a:prstGeom prst="rect">
             <a:avLst/>
           </a:prstGeom>
         </p:spPr>
       </p:pic>
+      <p:sp>
+        <p:nvSpPr>
+          <p:cNvPr id="7" name="TextBox 6"/>
+          <p:cNvSpPr txBox="1"/>
+          <p:nvPr/>
+        </p:nvSpPr>
+        <p:spPr>
+          <a:xfrm>
+            <a:off x="411091" y="1078317"/>
+            <a:ext cx="2471351" cy="523220"/>
+          </a:xfrm>
+          <a:prstGeom prst="rect">
+            <a:avLst/>
+          </a:prstGeom>
+          <a:noFill/>
+        </p:spPr>
+        <p:txBody>
+          <a:bodyPr wrap="square" rtlCol="0">
+            <a:spAutoFit/>
+          </a:bodyPr>
+          <a:lstStyle/>
+          <a:p>
+            <a:r>
+              <a:rPr lang="en-US" sz="2800" dirty="0" smtClean="0"/>
+              <a:t>N = 3</a:t>
+            </a:r>
+            <a:endParaRPr lang="en-US" sz="2800" dirty="0"/>
+          </a:p>
+        </p:txBody>
+      </p:sp>
+      <p:pic>
+        <p:nvPicPr>
+          <p:cNvPr id="8" name="Picture 7"/>
+          <p:cNvPicPr>
+            <a:picLocks noChangeAspect="1"/>
+          </p:cNvPicPr>
+          <p:nvPr/>
+        </p:nvPicPr>
+        <p:blipFill rotWithShape="1">
+          <a:blip r:embed="rId3">
+            <a:extLst>
+              <a:ext uri="{28A0092B-C50C-407E-A947-70E740481C1C}">
+                <a14:useLocalDpi xmlns:a14="http://schemas.microsoft.com/office/drawing/2010/main" val="0"/>
+              </a:ext>
+            </a:extLst>
+          </a:blip>
+          <a:srcRect l="27299" t="45754" r="58809" b="26290"/>
+          <a:stretch/>
+        </p:blipFill>
+        <p:spPr>
+          <a:xfrm>
+            <a:off x="8438608" y="1290928"/>
+            <a:ext cx="2072925" cy="2072925"/>
+          </a:xfrm>
+          <a:prstGeom prst="rect">
+            <a:avLst/>
+          </a:prstGeom>
+          <a:ln w="38100">
+            <a:solidFill>
+              <a:schemeClr val="tx1"/>
+            </a:solidFill>
+          </a:ln>
+        </p:spPr>
+      </p:pic>
+      <p:pic>
+        <p:nvPicPr>
+          <p:cNvPr id="9" name="Picture 8"/>
+          <p:cNvPicPr>
+            <a:picLocks noChangeAspect="1"/>
+          </p:cNvPicPr>
+          <p:nvPr/>
+        </p:nvPicPr>
+        <p:blipFill rotWithShape="1">
+          <a:blip r:embed="rId4">
+            <a:extLst>
+              <a:ext uri="{28A0092B-C50C-407E-A947-70E740481C1C}">
+                <a14:useLocalDpi xmlns:a14="http://schemas.microsoft.com/office/drawing/2010/main" val="0"/>
+              </a:ext>
+            </a:extLst>
+          </a:blip>
+          <a:srcRect l="30843" t="49063" r="55733" b="18052"/>
+          <a:stretch/>
+        </p:blipFill>
+        <p:spPr>
+          <a:xfrm>
+            <a:off x="8416333" y="4028532"/>
+            <a:ext cx="2095200" cy="2095200"/>
+          </a:xfrm>
+          <a:prstGeom prst="rect">
+            <a:avLst/>
+          </a:prstGeom>
+          <a:ln w="38100">
+            <a:solidFill>
+              <a:schemeClr val="tx1"/>
+            </a:solidFill>
+          </a:ln>
+        </p:spPr>
+      </p:pic>
+      <p:sp>
+        <p:nvSpPr>
+          <p:cNvPr id="10" name="Rectangle 9"/>
+          <p:cNvSpPr/>
+          <p:nvPr/>
+        </p:nvSpPr>
+        <p:spPr>
+          <a:xfrm>
+            <a:off x="2443162" y="2457450"/>
+            <a:ext cx="792099" cy="792099"/>
+          </a:xfrm>
+          <a:prstGeom prst="rect">
+            <a:avLst/>
+          </a:prstGeom>
+          <a:noFill/>
+          <a:ln w="38100">
+            <a:solidFill>
+              <a:schemeClr val="tx1"/>
+            </a:solidFill>
+          </a:ln>
+        </p:spPr>
+        <p:style>
+          <a:lnRef idx="2">
+            <a:schemeClr val="accent1">
+              <a:shade val="50000"/>
+            </a:schemeClr>
+          </a:lnRef>
+          <a:fillRef idx="1">
+            <a:schemeClr val="accent1"/>
+          </a:fillRef>
+          <a:effectRef idx="0">
+            <a:schemeClr val="accent1"/>
+          </a:effectRef>
+          <a:fontRef idx="minor">
+            <a:schemeClr val="lt1"/>
+          </a:fontRef>
+        </p:style>
+        <p:txBody>
+          <a:bodyPr rtlCol="0" anchor="ctr"/>
+          <a:lstStyle/>
+          <a:p>
+            <a:pPr algn="ctr"/>
+            <a:endParaRPr lang="en-US"/>
+          </a:p>
+        </p:txBody>
+      </p:sp>
+      <p:sp>
+        <p:nvSpPr>
+          <p:cNvPr id="11" name="Rectangle 10"/>
+          <p:cNvSpPr/>
+          <p:nvPr/>
+        </p:nvSpPr>
+        <p:spPr>
+          <a:xfrm>
+            <a:off x="2443162" y="4853084"/>
+            <a:ext cx="792099" cy="792099"/>
+          </a:xfrm>
+          <a:prstGeom prst="rect">
+            <a:avLst/>
+          </a:prstGeom>
+          <a:noFill/>
+          <a:ln w="38100">
+            <a:solidFill>
+              <a:schemeClr val="tx1"/>
+            </a:solidFill>
+          </a:ln>
+        </p:spPr>
+        <p:style>
+          <a:lnRef idx="2">
+            <a:schemeClr val="accent1">
+              <a:shade val="50000"/>
+            </a:schemeClr>
+          </a:lnRef>
+          <a:fillRef idx="1">
+            <a:schemeClr val="accent1"/>
+          </a:fillRef>
+          <a:effectRef idx="0">
+            <a:schemeClr val="accent1"/>
+          </a:effectRef>
+          <a:fontRef idx="minor">
+            <a:schemeClr val="lt1"/>
+          </a:fontRef>
+        </p:style>
+        <p:txBody>
+          <a:bodyPr rtlCol="0" anchor="ctr"/>
+          <a:lstStyle/>
+          <a:p>
+            <a:pPr algn="ctr"/>
+            <a:endParaRPr lang="en-US"/>
+          </a:p>
+        </p:txBody>
+      </p:sp>
+      <p:cxnSp>
+        <p:nvCxnSpPr>
+          <p:cNvPr id="13" name="Straight Connector 12"/>
+          <p:cNvCxnSpPr/>
+          <p:nvPr/>
+        </p:nvCxnSpPr>
+        <p:spPr>
+          <a:xfrm flipH="1">
+            <a:off x="3235263" y="1268843"/>
+            <a:ext cx="5181070" cy="1217595"/>
+          </a:xfrm>
+          <a:prstGeom prst="line">
+            <a:avLst/>
+          </a:prstGeom>
+          <a:ln>
+            <a:solidFill>
+              <a:schemeClr val="tx1"/>
+            </a:solidFill>
+          </a:ln>
+        </p:spPr>
+        <p:style>
+          <a:lnRef idx="1">
+            <a:schemeClr val="accent1"/>
+          </a:lnRef>
+          <a:fillRef idx="0">
+            <a:schemeClr val="accent1"/>
+          </a:fillRef>
+          <a:effectRef idx="0">
+            <a:schemeClr val="accent1"/>
+          </a:effectRef>
+          <a:fontRef idx="minor">
+            <a:schemeClr val="tx1"/>
+          </a:fontRef>
+        </p:style>
+      </p:cxnSp>
+      <p:cxnSp>
+        <p:nvCxnSpPr>
+          <p:cNvPr id="16" name="Straight Connector 15"/>
+          <p:cNvCxnSpPr/>
+          <p:nvPr/>
+        </p:nvCxnSpPr>
+        <p:spPr>
+          <a:xfrm>
+            <a:off x="3235261" y="3249549"/>
+            <a:ext cx="5181072" cy="114304"/>
+          </a:xfrm>
+          <a:prstGeom prst="line">
+            <a:avLst/>
+          </a:prstGeom>
+          <a:ln>
+            <a:solidFill>
+              <a:schemeClr val="tx1"/>
+            </a:solidFill>
+          </a:ln>
+        </p:spPr>
+        <p:style>
+          <a:lnRef idx="1">
+            <a:schemeClr val="accent1"/>
+          </a:lnRef>
+          <a:fillRef idx="0">
+            <a:schemeClr val="accent1"/>
+          </a:fillRef>
+          <a:effectRef idx="0">
+            <a:schemeClr val="accent1"/>
+          </a:effectRef>
+          <a:fontRef idx="minor">
+            <a:schemeClr val="tx1"/>
+          </a:fontRef>
+        </p:style>
+      </p:cxnSp>
+      <p:cxnSp>
+        <p:nvCxnSpPr>
+          <p:cNvPr id="18" name="Straight Connector 17"/>
+          <p:cNvCxnSpPr/>
+          <p:nvPr/>
+        </p:nvCxnSpPr>
+        <p:spPr>
+          <a:xfrm flipH="1">
+            <a:off x="3235261" y="3988595"/>
+            <a:ext cx="5181072" cy="864489"/>
+          </a:xfrm>
+          <a:prstGeom prst="line">
+            <a:avLst/>
+          </a:prstGeom>
+          <a:ln>
+            <a:solidFill>
+              <a:schemeClr val="tx1"/>
+            </a:solidFill>
+          </a:ln>
+        </p:spPr>
+        <p:style>
+          <a:lnRef idx="1">
+            <a:schemeClr val="accent1"/>
+          </a:lnRef>
+          <a:fillRef idx="0">
+            <a:schemeClr val="accent1"/>
+          </a:fillRef>
+          <a:effectRef idx="0">
+            <a:schemeClr val="accent1"/>
+          </a:effectRef>
+          <a:fontRef idx="minor">
+            <a:schemeClr val="tx1"/>
+          </a:fontRef>
+        </p:style>
+      </p:cxnSp>
+      <p:cxnSp>
+        <p:nvCxnSpPr>
+          <p:cNvPr id="20" name="Straight Connector 19"/>
+          <p:cNvCxnSpPr/>
+          <p:nvPr/>
+        </p:nvCxnSpPr>
+        <p:spPr>
+          <a:xfrm>
+            <a:off x="3235261" y="5645183"/>
+            <a:ext cx="5181072" cy="478549"/>
+          </a:xfrm>
+          <a:prstGeom prst="line">
+            <a:avLst/>
+          </a:prstGeom>
+          <a:ln>
+            <a:solidFill>
+              <a:schemeClr val="tx1"/>
+            </a:solidFill>
+          </a:ln>
+        </p:spPr>
+        <p:style>
+          <a:lnRef idx="1">
+            <a:schemeClr val="accent1"/>
+          </a:lnRef>
+          <a:fillRef idx="0">
+            <a:schemeClr val="accent1"/>
+          </a:fillRef>
+          <a:effectRef idx="0">
+            <a:schemeClr val="accent1"/>
+          </a:effectRef>
+          <a:fontRef idx="minor">
+            <a:schemeClr val="tx1"/>
+          </a:fontRef>
+        </p:style>
+      </p:cxnSp>
     </p:spTree>
     <p:extLst>
       <p:ext uri="{BB962C8B-B14F-4D97-AF65-F5344CB8AC3E}">
@@ -13224,7 +13594,7 @@
       </p:grpSpPr>
       <p:pic>
         <p:nvPicPr>
-          <p:cNvPr id="5" name="Picture 4"/>
+          <p:cNvPr id="3" name="Picture 2"/>
           <p:cNvPicPr>
             <a:picLocks noChangeAspect="1"/>
           </p:cNvPicPr>
@@ -13233,6 +13603,15 @@
         <p:blipFill>
           <a:blip r:embed="rId2">
             <a:extLst>
+              <a:ext uri="{BEBA8EAE-BF5A-486C-A8C5-ECC9F3942E4B}">
+                <a14:imgProps xmlns:a14="http://schemas.microsoft.com/office/drawing/2010/main">
+                  <a14:imgLayer r:embed="rId3">
+                    <a14:imgEffect>
+                      <a14:brightnessContrast contrast="100000"/>
+                    </a14:imgEffect>
+                  </a14:imgLayer>
+                </a14:imgProps>
+              </a:ext>
               <a:ext uri="{28A0092B-C50C-407E-A947-70E740481C1C}">
                 <a14:useLocalDpi xmlns:a14="http://schemas.microsoft.com/office/drawing/2010/main" val="0"/>
               </a:ext>
@@ -13244,8 +13623,8 @@
         </p:blipFill>
         <p:spPr>
           <a:xfrm>
-            <a:off x="116417" y="135467"/>
-            <a:ext cx="3060700" cy="635000"/>
+            <a:off x="8012952" y="2751021"/>
+            <a:ext cx="3800401" cy="3284733"/>
           </a:xfrm>
           <a:prstGeom prst="rect">
             <a:avLst/>
@@ -13254,67 +13633,7 @@
       </p:pic>
       <p:pic>
         <p:nvPicPr>
-          <p:cNvPr id="6" name="Picture 5"/>
-          <p:cNvPicPr>
-            <a:picLocks noChangeAspect="1"/>
-          </p:cNvPicPr>
-          <p:nvPr/>
-        </p:nvPicPr>
-        <p:blipFill>
-          <a:blip r:embed="rId3">
-            <a:extLst>
-              <a:ext uri="{28A0092B-C50C-407E-A947-70E740481C1C}">
-                <a14:useLocalDpi xmlns:a14="http://schemas.microsoft.com/office/drawing/2010/main" val="0"/>
-              </a:ext>
-            </a:extLst>
-          </a:blip>
-          <a:stretch>
-            <a:fillRect/>
-          </a:stretch>
-        </p:blipFill>
-        <p:spPr>
-          <a:xfrm>
-            <a:off x="10358439" y="4756321"/>
-            <a:ext cx="1833561" cy="2187407"/>
-          </a:xfrm>
-          <a:prstGeom prst="rect">
-            <a:avLst/>
-          </a:prstGeom>
-        </p:spPr>
-      </p:pic>
-      <p:sp>
-        <p:nvSpPr>
-          <p:cNvPr id="2" name="TextBox 1"/>
-          <p:cNvSpPr txBox="1"/>
-          <p:nvPr/>
-        </p:nvSpPr>
-        <p:spPr>
-          <a:xfrm flipH="1">
-            <a:off x="4012236" y="1410380"/>
-            <a:ext cx="4748703" cy="1015663"/>
-          </a:xfrm>
-          <a:prstGeom prst="rect">
-            <a:avLst/>
-          </a:prstGeom>
-          <a:noFill/>
-        </p:spPr>
-        <p:txBody>
-          <a:bodyPr wrap="square" rtlCol="0">
-            <a:spAutoFit/>
-          </a:bodyPr>
-          <a:lstStyle/>
-          <a:p>
-            <a:r>
-              <a:rPr lang="en-US" sz="6000" b="1" dirty="0" smtClean="0"/>
-              <a:t>KOCH CURVE</a:t>
-            </a:r>
-            <a:endParaRPr lang="en-US" sz="6000" b="1" dirty="0"/>
-          </a:p>
-        </p:txBody>
-      </p:sp>
-      <p:pic>
-        <p:nvPicPr>
-          <p:cNvPr id="4" name="Picture 3"/>
+          <p:cNvPr id="5" name="Picture 4"/>
           <p:cNvPicPr>
             <a:picLocks noChangeAspect="1"/>
           </p:cNvPicPr>
@@ -13334,14 +13653,74 @@
         </p:blipFill>
         <p:spPr>
           <a:xfrm>
-            <a:off x="12192000" y="2655378"/>
-            <a:ext cx="3175000" cy="3810000"/>
+            <a:off x="116417" y="135467"/>
+            <a:ext cx="3060700" cy="635000"/>
           </a:xfrm>
           <a:prstGeom prst="rect">
             <a:avLst/>
           </a:prstGeom>
         </p:spPr>
       </p:pic>
+      <p:pic>
+        <p:nvPicPr>
+          <p:cNvPr id="6" name="Picture 5"/>
+          <p:cNvPicPr>
+            <a:picLocks noChangeAspect="1"/>
+          </p:cNvPicPr>
+          <p:nvPr/>
+        </p:nvPicPr>
+        <p:blipFill>
+          <a:blip r:embed="rId5">
+            <a:extLst>
+              <a:ext uri="{28A0092B-C50C-407E-A947-70E740481C1C}">
+                <a14:useLocalDpi xmlns:a14="http://schemas.microsoft.com/office/drawing/2010/main" val="0"/>
+              </a:ext>
+            </a:extLst>
+          </a:blip>
+          <a:stretch>
+            <a:fillRect/>
+          </a:stretch>
+        </p:blipFill>
+        <p:spPr>
+          <a:xfrm>
+            <a:off x="10358439" y="4756321"/>
+            <a:ext cx="1833561" cy="2187407"/>
+          </a:xfrm>
+          <a:prstGeom prst="rect">
+            <a:avLst/>
+          </a:prstGeom>
+        </p:spPr>
+      </p:pic>
+      <p:sp>
+        <p:nvSpPr>
+          <p:cNvPr id="2" name="TextBox 1"/>
+          <p:cNvSpPr txBox="1"/>
+          <p:nvPr/>
+        </p:nvSpPr>
+        <p:spPr>
+          <a:xfrm flipH="1">
+            <a:off x="4012236" y="1410380"/>
+            <a:ext cx="4748703" cy="1015663"/>
+          </a:xfrm>
+          <a:prstGeom prst="rect">
+            <a:avLst/>
+          </a:prstGeom>
+          <a:noFill/>
+        </p:spPr>
+        <p:txBody>
+          <a:bodyPr wrap="square" rtlCol="0">
+            <a:spAutoFit/>
+          </a:bodyPr>
+          <a:lstStyle/>
+          <a:p>
+            <a:r>
+              <a:rPr lang="en-US" sz="6000" b="1" dirty="0" smtClean="0"/>
+              <a:t>KOCH CURVE</a:t>
+            </a:r>
+            <a:endParaRPr lang="en-US" sz="6000" b="1" dirty="0"/>
+          </a:p>
+        </p:txBody>
+      </p:sp>
       <p:pic>
         <p:nvPicPr>
           <p:cNvPr id="10" name="Picture 9"/>
@@ -13351,15 +13730,45 @@
           <p:nvPr/>
         </p:nvPicPr>
         <p:blipFill>
-          <a:blip r:embed="rId5"/>
+          <a:blip r:embed="rId6"/>
           <a:stretch>
             <a:fillRect/>
           </a:stretch>
         </p:blipFill>
         <p:spPr>
           <a:xfrm>
-            <a:off x="4788581" y="2655378"/>
+            <a:off x="759483" y="2783970"/>
             <a:ext cx="2654300" cy="3060700"/>
+          </a:xfrm>
+          <a:prstGeom prst="rect">
+            <a:avLst/>
+          </a:prstGeom>
+        </p:spPr>
+      </p:pic>
+      <p:pic>
+        <p:nvPicPr>
+          <p:cNvPr id="7" name="Picture 6"/>
+          <p:cNvPicPr>
+            <a:picLocks noChangeAspect="1"/>
+          </p:cNvPicPr>
+          <p:nvPr/>
+        </p:nvPicPr>
+        <p:blipFill>
+          <a:blip r:embed="rId7">
+            <a:extLst>
+              <a:ext uri="{28A0092B-C50C-407E-A947-70E740481C1C}">
+                <a14:useLocalDpi xmlns:a14="http://schemas.microsoft.com/office/drawing/2010/main" val="0"/>
+              </a:ext>
+            </a:extLst>
+          </a:blip>
+          <a:stretch>
+            <a:fillRect/>
+          </a:stretch>
+        </p:blipFill>
+        <p:spPr>
+          <a:xfrm>
+            <a:off x="4183767" y="2614603"/>
+            <a:ext cx="3538551" cy="3386504"/>
           </a:xfrm>
           <a:prstGeom prst="rect">
             <a:avLst/>
@@ -13379,193 +13788,7 @@
   <p:timing>
     <p:tnLst>
       <p:par>
-        <p:cTn id="1" dur="indefinite" restart="never" nodeType="tmRoot">
-          <p:childTnLst>
-            <p:seq concurrent="1" nextAc="seek">
-              <p:cTn id="2" dur="indefinite" nodeType="mainSeq">
-                <p:childTnLst>
-                  <p:par>
-                    <p:cTn id="3" fill="hold">
-                      <p:stCondLst>
-                        <p:cond delay="indefinite"/>
-                      </p:stCondLst>
-                      <p:childTnLst>
-                        <p:par>
-                          <p:cTn id="4" fill="hold">
-                            <p:stCondLst>
-                              <p:cond delay="0"/>
-                            </p:stCondLst>
-                            <p:childTnLst>
-                              <p:par>
-                                <p:cTn id="5" presetID="1" presetClass="entr" presetSubtype="0" fill="hold" nodeType="clickEffect">
-                                  <p:stCondLst>
-                                    <p:cond delay="0"/>
-                                  </p:stCondLst>
-                                  <p:childTnLst>
-                                    <p:set>
-                                      <p:cBhvr>
-                                        <p:cTn id="6" dur="1" fill="hold">
-                                          <p:stCondLst>
-                                            <p:cond delay="0"/>
-                                          </p:stCondLst>
-                                        </p:cTn>
-                                        <p:tgtEl>
-                                          <p:spTgt spid="10"/>
-                                        </p:tgtEl>
-                                        <p:attrNameLst>
-                                          <p:attrName>style.visibility</p:attrName>
-                                        </p:attrNameLst>
-                                      </p:cBhvr>
-                                      <p:to>
-                                        <p:strVal val="visible"/>
-                                      </p:to>
-                                    </p:set>
-                                  </p:childTnLst>
-                                </p:cTn>
-                              </p:par>
-                            </p:childTnLst>
-                          </p:cTn>
-                        </p:par>
-                      </p:childTnLst>
-                    </p:cTn>
-                  </p:par>
-                  <p:par>
-                    <p:cTn id="7" fill="hold">
-                      <p:stCondLst>
-                        <p:cond delay="indefinite"/>
-                      </p:stCondLst>
-                      <p:childTnLst>
-                        <p:par>
-                          <p:cTn id="8" fill="hold">
-                            <p:stCondLst>
-                              <p:cond delay="0"/>
-                            </p:stCondLst>
-                            <p:childTnLst>
-                              <p:par>
-                                <p:cTn id="9" presetID="1" presetClass="exit" presetSubtype="0" fill="hold" nodeType="clickEffect">
-                                  <p:stCondLst>
-                                    <p:cond delay="0"/>
-                                  </p:stCondLst>
-                                  <p:childTnLst>
-                                    <p:set>
-                                      <p:cBhvr>
-                                        <p:cTn id="10" dur="1" fill="hold">
-                                          <p:stCondLst>
-                                            <p:cond delay="0"/>
-                                          </p:stCondLst>
-                                        </p:cTn>
-                                        <p:tgtEl>
-                                          <p:spTgt spid="10"/>
-                                        </p:tgtEl>
-                                        <p:attrNameLst>
-                                          <p:attrName>style.visibility</p:attrName>
-                                        </p:attrNameLst>
-                                      </p:cBhvr>
-                                      <p:to>
-                                        <p:strVal val="hidden"/>
-                                      </p:to>
-                                    </p:set>
-                                  </p:childTnLst>
-                                </p:cTn>
-                              </p:par>
-                              <p:par>
-                                <p:cTn id="11" presetID="2" presetClass="entr" presetSubtype="8" repeatCount="indefinite" fill="hold" nodeType="withEffect">
-                                  <p:stCondLst>
-                                    <p:cond delay="0"/>
-                                  </p:stCondLst>
-                                  <p:childTnLst>
-                                    <p:set>
-                                      <p:cBhvr>
-                                        <p:cTn id="12" dur="1" fill="hold">
-                                          <p:stCondLst>
-                                            <p:cond delay="0"/>
-                                          </p:stCondLst>
-                                        </p:cTn>
-                                        <p:tgtEl>
-                                          <p:spTgt spid="4"/>
-                                        </p:tgtEl>
-                                        <p:attrNameLst>
-                                          <p:attrName>style.visibility</p:attrName>
-                                        </p:attrNameLst>
-                                      </p:cBhvr>
-                                      <p:to>
-                                        <p:strVal val="visible"/>
-                                      </p:to>
-                                    </p:set>
-                                    <p:anim calcmode="lin" valueType="num">
-                                      <p:cBhvr additive="base">
-                                        <p:cTn id="13" dur="10000" fill="hold"/>
-                                        <p:tgtEl>
-                                          <p:spTgt spid="4"/>
-                                        </p:tgtEl>
-                                        <p:attrNameLst>
-                                          <p:attrName>ppt_x</p:attrName>
-                                        </p:attrNameLst>
-                                      </p:cBhvr>
-                                      <p:tavLst>
-                                        <p:tav tm="0">
-                                          <p:val>
-                                            <p:strVal val="0-#ppt_w/2"/>
-                                          </p:val>
-                                        </p:tav>
-                                        <p:tav tm="100000">
-                                          <p:val>
-                                            <p:strVal val="#ppt_x"/>
-                                          </p:val>
-                                        </p:tav>
-                                      </p:tavLst>
-                                    </p:anim>
-                                    <p:anim calcmode="lin" valueType="num">
-                                      <p:cBhvr additive="base">
-                                        <p:cTn id="14" dur="10000" fill="hold"/>
-                                        <p:tgtEl>
-                                          <p:spTgt spid="4"/>
-                                        </p:tgtEl>
-                                        <p:attrNameLst>
-                                          <p:attrName>ppt_y</p:attrName>
-                                        </p:attrNameLst>
-                                      </p:cBhvr>
-                                      <p:tavLst>
-                                        <p:tav tm="0">
-                                          <p:val>
-                                            <p:strVal val="#ppt_y"/>
-                                          </p:val>
-                                        </p:tav>
-                                        <p:tav tm="100000">
-                                          <p:val>
-                                            <p:strVal val="#ppt_y"/>
-                                          </p:val>
-                                        </p:tav>
-                                      </p:tavLst>
-                                    </p:anim>
-                                  </p:childTnLst>
-                                </p:cTn>
-                              </p:par>
-                            </p:childTnLst>
-                          </p:cTn>
-                        </p:par>
-                      </p:childTnLst>
-                    </p:cTn>
-                  </p:par>
-                </p:childTnLst>
-              </p:cTn>
-              <p:prevCondLst>
-                <p:cond evt="onPrev" delay="0">
-                  <p:tgtEl>
-                    <p:sldTgt/>
-                  </p:tgtEl>
-                </p:cond>
-              </p:prevCondLst>
-              <p:nextCondLst>
-                <p:cond evt="onNext" delay="0">
-                  <p:tgtEl>
-                    <p:sldTgt/>
-                  </p:tgtEl>
-                </p:cond>
-              </p:nextCondLst>
-            </p:seq>
-          </p:childTnLst>
-        </p:cTn>
+        <p:cTn id="1" dur="indefinite" restart="never" nodeType="tmRoot"/>
       </p:par>
     </p:tnLst>
   </p:timing>

</xml_diff>